<commit_message>
Minor changes to the my parts in the final presentations
</commit_message>
<xml_diff>
--- a/FinalPresentation/FinalPresentation-v2.pptx
+++ b/FinalPresentation/FinalPresentation-v2.pptx
@@ -214,11 +214,11 @@
         </c:dLbls>
         <c:gapWidth val="219"/>
         <c:overlap val="-27"/>
-        <c:axId val="-2108189632"/>
-        <c:axId val="-2108184192"/>
+        <c:axId val="123915312"/>
+        <c:axId val="169034032"/>
       </c:barChart>
       <c:catAx>
-        <c:axId val="-2108189632"/>
+        <c:axId val="123915312"/>
         <c:scaling>
           <c:orientation val="minMax"/>
         </c:scaling>
@@ -324,7 +324,7 @@
             <a:endParaRPr lang="en-US"/>
           </a:p>
         </c:txPr>
-        <c:crossAx val="-2108184192"/>
+        <c:crossAx val="169034032"/>
         <c:crosses val="autoZero"/>
         <c:auto val="1"/>
         <c:lblAlgn val="ctr"/>
@@ -332,7 +332,7 @@
         <c:noMultiLvlLbl val="0"/>
       </c:catAx>
       <c:valAx>
-        <c:axId val="-2108184192"/>
+        <c:axId val="169034032"/>
         <c:scaling>
           <c:orientation val="minMax"/>
         </c:scaling>
@@ -439,7 +439,7 @@
             <a:endParaRPr lang="en-US"/>
           </a:p>
         </c:txPr>
-        <c:crossAx val="-2108189632"/>
+        <c:crossAx val="123915312"/>
         <c:crosses val="autoZero"/>
         <c:crossBetween val="between"/>
       </c:valAx>
@@ -573,11 +573,11 @@
         </c:dLbls>
         <c:gapWidth val="219"/>
         <c:overlap val="-27"/>
-        <c:axId val="-2108191264"/>
-        <c:axId val="-2108184736"/>
+        <c:axId val="169035712"/>
+        <c:axId val="169036272"/>
       </c:barChart>
       <c:catAx>
-        <c:axId val="-2108191264"/>
+        <c:axId val="169035712"/>
         <c:scaling>
           <c:orientation val="minMax"/>
         </c:scaling>
@@ -683,7 +683,7 @@
             <a:endParaRPr lang="en-US"/>
           </a:p>
         </c:txPr>
-        <c:crossAx val="-2108184736"/>
+        <c:crossAx val="169036272"/>
         <c:crosses val="autoZero"/>
         <c:auto val="1"/>
         <c:lblAlgn val="ctr"/>
@@ -691,7 +691,7 @@
         <c:noMultiLvlLbl val="0"/>
       </c:catAx>
       <c:valAx>
-        <c:axId val="-2108184736"/>
+        <c:axId val="169036272"/>
         <c:scaling>
           <c:orientation val="minMax"/>
         </c:scaling>
@@ -798,7 +798,7 @@
             <a:endParaRPr lang="en-US"/>
           </a:p>
         </c:txPr>
-        <c:crossAx val="-2108191264"/>
+        <c:crossAx val="169035712"/>
         <c:crosses val="autoZero"/>
         <c:crossBetween val="between"/>
       </c:valAx>
@@ -1141,11 +1141,11 @@
         </c:dLbls>
         <c:gapWidth val="219"/>
         <c:overlap val="-27"/>
-        <c:axId val="-2108183104"/>
-        <c:axId val="-2108181472"/>
+        <c:axId val="172552352"/>
+        <c:axId val="172552912"/>
       </c:barChart>
       <c:catAx>
-        <c:axId val="-2108183104"/>
+        <c:axId val="172552352"/>
         <c:scaling>
           <c:orientation val="minMax"/>
         </c:scaling>
@@ -1188,7 +1188,7 @@
             <a:endParaRPr lang="en-US"/>
           </a:p>
         </c:txPr>
-        <c:crossAx val="-2108181472"/>
+        <c:crossAx val="172552912"/>
         <c:crosses val="autoZero"/>
         <c:auto val="1"/>
         <c:lblAlgn val="ctr"/>
@@ -1196,7 +1196,7 @@
         <c:noMultiLvlLbl val="0"/>
       </c:catAx>
       <c:valAx>
-        <c:axId val="-2108181472"/>
+        <c:axId val="172552912"/>
         <c:scaling>
           <c:orientation val="minMax"/>
         </c:scaling>
@@ -1303,7 +1303,7 @@
             <a:endParaRPr lang="en-US"/>
           </a:p>
         </c:txPr>
-        <c:crossAx val="-2108183104"/>
+        <c:crossAx val="172552352"/>
         <c:crosses val="autoZero"/>
         <c:crossBetween val="between"/>
         <c:majorUnit val="1"/>
@@ -1477,11 +1477,11 @@
         </c:dLbls>
         <c:gapWidth val="219"/>
         <c:overlap val="-27"/>
-        <c:axId val="-2108195072"/>
-        <c:axId val="-2108193984"/>
+        <c:axId val="168850592"/>
+        <c:axId val="168860672"/>
       </c:barChart>
       <c:catAx>
-        <c:axId val="-2108195072"/>
+        <c:axId val="168850592"/>
         <c:scaling>
           <c:orientation val="minMax"/>
         </c:scaling>
@@ -1580,7 +1580,7 @@
             <a:endParaRPr lang="en-US"/>
           </a:p>
         </c:txPr>
-        <c:crossAx val="-2108193984"/>
+        <c:crossAx val="168860672"/>
         <c:crosses val="autoZero"/>
         <c:auto val="1"/>
         <c:lblAlgn val="ctr"/>
@@ -1588,7 +1588,7 @@
         <c:noMultiLvlLbl val="0"/>
       </c:catAx>
       <c:valAx>
-        <c:axId val="-2108193984"/>
+        <c:axId val="168860672"/>
         <c:scaling>
           <c:orientation val="minMax"/>
         </c:scaling>
@@ -1695,7 +1695,7 @@
             <a:endParaRPr lang="en-US"/>
           </a:p>
         </c:txPr>
-        <c:crossAx val="-2108195072"/>
+        <c:crossAx val="168850592"/>
         <c:crosses val="autoZero"/>
         <c:crossBetween val="between"/>
       </c:valAx>
@@ -4077,7 +4077,7 @@
           <a:p>
             <a:fld id="{BC58CC46-0132-4CEE-ABDB-36235E875E40}" type="datetimeFigureOut">
               <a:rPr lang="en-US" smtClean="0"/>
-              <a:t>12/8/2016</a:t>
+              <a:t>12/9/2016</a:t>
             </a:fld>
             <a:endParaRPr lang="en-US"/>
           </a:p>
@@ -4305,7 +4305,7 @@
           <a:p>
             <a:fld id="{BC58CC46-0132-4CEE-ABDB-36235E875E40}" type="datetimeFigureOut">
               <a:rPr lang="en-US" smtClean="0"/>
-              <a:t>12/8/2016</a:t>
+              <a:t>12/9/2016</a:t>
             </a:fld>
             <a:endParaRPr lang="en-US"/>
           </a:p>
@@ -4485,7 +4485,7 @@
           <a:p>
             <a:fld id="{BC58CC46-0132-4CEE-ABDB-36235E875E40}" type="datetimeFigureOut">
               <a:rPr lang="en-US" smtClean="0"/>
-              <a:t>12/8/2016</a:t>
+              <a:t>12/9/2016</a:t>
             </a:fld>
             <a:endParaRPr lang="en-US"/>
           </a:p>
@@ -4655,7 +4655,7 @@
           <a:p>
             <a:fld id="{BC58CC46-0132-4CEE-ABDB-36235E875E40}" type="datetimeFigureOut">
               <a:rPr lang="en-US" smtClean="0"/>
-              <a:t>12/8/2016</a:t>
+              <a:t>12/9/2016</a:t>
             </a:fld>
             <a:endParaRPr lang="en-US"/>
           </a:p>
@@ -4909,7 +4909,7 @@
           <a:p>
             <a:fld id="{BC58CC46-0132-4CEE-ABDB-36235E875E40}" type="datetimeFigureOut">
               <a:rPr lang="en-US" smtClean="0"/>
-              <a:t>12/8/2016</a:t>
+              <a:t>12/9/2016</a:t>
             </a:fld>
             <a:endParaRPr lang="en-US"/>
           </a:p>
@@ -5235,7 +5235,7 @@
           <a:p>
             <a:fld id="{BC58CC46-0132-4CEE-ABDB-36235E875E40}" type="datetimeFigureOut">
               <a:rPr lang="en-US" smtClean="0"/>
-              <a:t>12/8/2016</a:t>
+              <a:t>12/9/2016</a:t>
             </a:fld>
             <a:endParaRPr lang="en-US"/>
           </a:p>
@@ -5686,7 +5686,7 @@
           <a:p>
             <a:fld id="{BC58CC46-0132-4CEE-ABDB-36235E875E40}" type="datetimeFigureOut">
               <a:rPr lang="en-US" smtClean="0"/>
-              <a:t>12/8/2016</a:t>
+              <a:t>12/9/2016</a:t>
             </a:fld>
             <a:endParaRPr lang="en-US"/>
           </a:p>
@@ -5804,7 +5804,7 @@
           <a:p>
             <a:fld id="{BC58CC46-0132-4CEE-ABDB-36235E875E40}" type="datetimeFigureOut">
               <a:rPr lang="en-US" smtClean="0"/>
-              <a:t>12/8/2016</a:t>
+              <a:t>12/9/2016</a:t>
             </a:fld>
             <a:endParaRPr lang="en-US"/>
           </a:p>
@@ -5899,7 +5899,7 @@
           <a:p>
             <a:fld id="{BC58CC46-0132-4CEE-ABDB-36235E875E40}" type="datetimeFigureOut">
               <a:rPr lang="en-US" smtClean="0"/>
-              <a:t>12/8/2016</a:t>
+              <a:t>12/9/2016</a:t>
             </a:fld>
             <a:endParaRPr lang="en-US"/>
           </a:p>
@@ -6186,7 +6186,7 @@
           <a:p>
             <a:fld id="{BC58CC46-0132-4CEE-ABDB-36235E875E40}" type="datetimeFigureOut">
               <a:rPr lang="en-US" smtClean="0"/>
-              <a:t>12/8/2016</a:t>
+              <a:t>12/9/2016</a:t>
             </a:fld>
             <a:endParaRPr lang="en-US"/>
           </a:p>
@@ -6508,7 +6508,7 @@
           <a:p>
             <a:fld id="{BC58CC46-0132-4CEE-ABDB-36235E875E40}" type="datetimeFigureOut">
               <a:rPr lang="en-US" smtClean="0"/>
-              <a:t>12/8/2016</a:t>
+              <a:t>12/9/2016</a:t>
             </a:fld>
             <a:endParaRPr lang="en-US"/>
           </a:p>
@@ -6762,7 +6762,7 @@
           <a:p>
             <a:fld id="{BC58CC46-0132-4CEE-ABDB-36235E875E40}" type="datetimeFigureOut">
               <a:rPr lang="en-US" smtClean="0"/>
-              <a:t>12/8/2016</a:t>
+              <a:t>12/9/2016</a:t>
             </a:fld>
             <a:endParaRPr lang="en-US"/>
           </a:p>
@@ -7381,8 +7381,8 @@
           </a:p>
         </p:txBody>
       </p:sp>
-      <mc:AlternateContent xmlns:mc="http://schemas.openxmlformats.org/markup-compatibility/2006" xmlns:a14="http://schemas.microsoft.com/office/drawing/2010/main">
-        <mc:Choice Requires="a14">
+      <mc:AlternateContent xmlns:mc="http://schemas.openxmlformats.org/markup-compatibility/2006">
+        <mc:Choice xmlns:a14="http://schemas.microsoft.com/office/drawing/2010/main" Requires="a14">
           <p:sp>
             <p:nvSpPr>
               <p:cNvPr id="3" name="Content Placeholder 2"/>
@@ -7400,13 +7400,29 @@
               <a:p>
                 <a:r>
                   <a:rPr lang="en-US" dirty="0"/>
-                  <a:t>Goal: Determining reasonable word spacing amount:</a:t>
+                  <a:t>Goal: </a:t>
+                </a:r>
+                <a:r>
+                  <a:rPr lang="en-US" dirty="0" smtClean="0"/>
+                  <a:t>Determining the </a:t>
+                </a:r>
+                <a:r>
+                  <a:rPr lang="en-US" dirty="0"/>
+                  <a:t>reasonable word spacing amount:</a:t>
                 </a:r>
               </a:p>
               <a:p>
                 <a:r>
                   <a:rPr lang="en-US" dirty="0" smtClean="0"/>
-                  <a:t>7 different text box sizes were selected for tests:</a:t>
+                  <a:t>7 different text box sizes were selected </a:t>
+                </a:r>
+                <a:r>
+                  <a:rPr lang="en-US" dirty="0" smtClean="0"/>
+                  <a:t>for the </a:t>
+                </a:r>
+                <a:r>
+                  <a:rPr lang="en-US" dirty="0" smtClean="0"/>
+                  <a:t>tests:</a:t>
                 </a:r>
               </a:p>
               <a:p>
@@ -7551,7 +7567,7 @@
             </p:txBody>
           </p:sp>
         </mc:Choice>
-        <mc:Fallback xmlns="">
+        <mc:Fallback>
           <p:sp>
             <p:nvSpPr>
               <p:cNvPr id="3" name="Content Placeholder 2"/>
@@ -7607,7 +7623,7 @@
         </p:blipFill>
         <p:spPr>
           <a:xfrm>
-            <a:off x="7291374" y="2164520"/>
+            <a:off x="7405674" y="2228020"/>
             <a:ext cx="2743200" cy="1734576"/>
           </a:xfrm>
           <a:prstGeom prst="rect">
@@ -8664,7 +8680,15 @@
             </a:pPr>
             <a:r>
               <a:rPr lang="en-US" dirty="0" smtClean="0"/>
-              <a:t>High sensitivity  of calibration process</a:t>
+              <a:t>High sensitivity  </a:t>
+            </a:r>
+            <a:r>
+              <a:rPr lang="en-US" dirty="0" smtClean="0"/>
+              <a:t>of the </a:t>
+            </a:r>
+            <a:r>
+              <a:rPr lang="en-US" dirty="0" smtClean="0"/>
+              <a:t>calibration process</a:t>
             </a:r>
           </a:p>
           <a:p>
@@ -8681,8 +8705,13 @@
             </a:pPr>
             <a:r>
               <a:rPr lang="en-US" dirty="0" smtClean="0"/>
-              <a:t>limited number of experiments</a:t>
-            </a:r>
+              <a:t>limited number of </a:t>
+            </a:r>
+            <a:r>
+              <a:rPr lang="en-US" dirty="0" smtClean="0"/>
+              <a:t>the experiments</a:t>
+            </a:r>
+            <a:endParaRPr lang="en-US" dirty="0" smtClean="0"/>
           </a:p>
           <a:p>
             <a:pPr marL="617220" lvl="1" indent="-342900">
@@ -8852,8 +8881,8 @@
               <a:t>400</a:t>
             </a:r>
             <a:r>
-              <a:rPr lang="en-US" dirty="0"/>
-              <a:t>, </a:t>
+              <a:rPr lang="en-US" dirty="0" smtClean="0"/>
+              <a:t>, 450, </a:t>
             </a:r>
             <a:r>
               <a:rPr lang="en-US" dirty="0" smtClean="0"/>
@@ -9107,7 +9136,7 @@
         </p:spPr>
         <p:txBody>
           <a:bodyPr>
-            <a:normAutofit/>
+            <a:normAutofit lnSpcReduction="10000"/>
           </a:bodyPr>
           <a:lstStyle/>
           <a:p>
@@ -9120,7 +9149,23 @@
             <a:pPr lvl="1"/>
             <a:r>
               <a:rPr lang="en-US" dirty="0" smtClean="0"/>
-              <a:t>Develop techniques to convert eye tracking into the precision text detecting during reading for children</a:t>
+              <a:t>Develop techniques to convert </a:t>
+            </a:r>
+            <a:r>
+              <a:rPr lang="en-US" dirty="0" smtClean="0"/>
+              <a:t>eye the </a:t>
+            </a:r>
+            <a:r>
+              <a:rPr lang="en-US" dirty="0" smtClean="0"/>
+              <a:t>tracking into the precision text detecting during </a:t>
+            </a:r>
+            <a:r>
+              <a:rPr lang="en-US" dirty="0" smtClean="0"/>
+              <a:t>the reading </a:t>
+            </a:r>
+            <a:r>
+              <a:rPr lang="en-US" dirty="0" smtClean="0"/>
+              <a:t>for children</a:t>
             </a:r>
           </a:p>
           <a:p>
@@ -9140,8 +9185,20 @@
             <a:pPr lvl="1"/>
             <a:r>
               <a:rPr lang="en-US" dirty="0" smtClean="0"/>
-              <a:t>User who wants detect text</a:t>
-            </a:r>
+              <a:t>User who wants detect </a:t>
+            </a:r>
+            <a:r>
+              <a:rPr lang="en-US" dirty="0" smtClean="0"/>
+              <a:t>text</a:t>
+            </a:r>
+          </a:p>
+          <a:p>
+            <a:pPr lvl="1"/>
+            <a:r>
+              <a:rPr lang="en-US" dirty="0" smtClean="0"/>
+              <a:t>Eye tracker</a:t>
+            </a:r>
+            <a:endParaRPr lang="en-US" dirty="0" smtClean="0"/>
           </a:p>
           <a:p>
             <a:r>
@@ -9860,8 +9917,13 @@
             <a:pPr lvl="1"/>
             <a:r>
               <a:rPr lang="en-US" b="1" dirty="0" smtClean="0"/>
-              <a:t>How detect eyes continuously</a:t>
-            </a:r>
+              <a:t>How detect eyes </a:t>
+            </a:r>
+            <a:r>
+              <a:rPr lang="en-US" b="1" dirty="0" smtClean="0"/>
+              <a:t>continuously and constantly</a:t>
+            </a:r>
+            <a:endParaRPr lang="en-US" b="1" dirty="0" smtClean="0"/>
           </a:p>
           <a:p>
             <a:pPr lvl="1"/>
@@ -9882,7 +9944,11 @@
             <a:pPr lvl="1"/>
             <a:r>
               <a:rPr lang="en-US" b="1" dirty="0" smtClean="0"/>
-              <a:t>Overcome the limitation of the </a:t>
+              <a:t>The </a:t>
+            </a:r>
+            <a:r>
+              <a:rPr lang="en-US" b="1" dirty="0" smtClean="0"/>
+              <a:t>limitation of the </a:t>
             </a:r>
             <a:r>
               <a:rPr lang="en-US" b="1" dirty="0" err="1" smtClean="0"/>

</xml_diff>

<commit_message>
Updates to presentation before submission
</commit_message>
<xml_diff>
--- a/FinalPresentation/FinalPresentation-v2.pptx
+++ b/FinalPresentation/FinalPresentation-v2.pptx
@@ -135,7 +135,7 @@
 </file>
 
 <file path=ppt/charts/chart1.xml><?xml version="1.0" encoding="utf-8"?>
-<c:chartSpace xmlns:c="http://schemas.openxmlformats.org/drawingml/2006/chart" xmlns:a="http://schemas.openxmlformats.org/drawingml/2006/main" xmlns:r="http://schemas.openxmlformats.org/officeDocument/2006/relationships">
+<c:chartSpace xmlns:c="http://schemas.openxmlformats.org/drawingml/2006/chart" xmlns:a="http://schemas.openxmlformats.org/drawingml/2006/main" xmlns:r="http://schemas.openxmlformats.org/officeDocument/2006/relationships" xmlns:c16r2="http://schemas.microsoft.com/office/drawing/2015/06/chart">
   <c:date1904 val="0"/>
   <c:lang val="en-US"/>
   <c:roundedCorners val="0"/>
@@ -192,17 +192,22 @@
                 <c:formatCode>General</c:formatCode>
                 <c:ptCount val="3"/>
                 <c:pt idx="0">
-                  <c:v>0.757142857142857</c:v>
+                  <c:v>0.75714285714285723</c:v>
                 </c:pt>
                 <c:pt idx="1">
-                  <c:v>0.842857142857143</c:v>
+                  <c:v>0.84285714285714286</c:v>
                 </c:pt>
                 <c:pt idx="2">
-                  <c:v>0.714285714285714</c:v>
+                  <c:v>0.7142857142857143</c:v>
                 </c:pt>
               </c:numCache>
             </c:numRef>
           </c:val>
+          <c:extLst>
+            <c:ext xmlns:c16="http://schemas.microsoft.com/office/drawing/2014/chart" uri="{C3380CC4-5D6E-409C-BE32-E72D297353CC}">
+              <c16:uniqueId val="{00000000-6609-4530-8721-F7DDF3536187}"/>
+            </c:ext>
+          </c:extLst>
         </c:ser>
         <c:dLbls>
           <c:showLegendKey val="0"/>
@@ -214,11 +219,11 @@
         </c:dLbls>
         <c:gapWidth val="219"/>
         <c:overlap val="-27"/>
-        <c:axId val="-1875897536"/>
-        <c:axId val="-1875757008"/>
+        <c:axId val="123915312"/>
+        <c:axId val="169034032"/>
       </c:barChart>
       <c:catAx>
-        <c:axId val="-1875897536"/>
+        <c:axId val="123915312"/>
         <c:scaling>
           <c:orientation val="minMax"/>
         </c:scaling>
@@ -254,8 +259,8 @@
             <c:manualLayout>
               <c:xMode val="edge"/>
               <c:yMode val="edge"/>
-              <c:x val="0.459680318208164"/>
-              <c:y val="0.911194460180614"/>
+              <c:x val="0.45968031820816396"/>
+              <c:y val="0.91119446018061356"/>
             </c:manualLayout>
           </c:layout>
           <c:overlay val="0"/>
@@ -324,7 +329,7 @@
             <a:endParaRPr lang="en-US"/>
           </a:p>
         </c:txPr>
-        <c:crossAx val="-1875757008"/>
+        <c:crossAx val="169034032"/>
         <c:crosses val="autoZero"/>
         <c:auto val="1"/>
         <c:lblAlgn val="ctr"/>
@@ -332,7 +337,7 @@
         <c:noMultiLvlLbl val="0"/>
       </c:catAx>
       <c:valAx>
-        <c:axId val="-1875757008"/>
+        <c:axId val="169034032"/>
         <c:scaling>
           <c:orientation val="minMax"/>
         </c:scaling>
@@ -438,7 +443,7 @@
             <a:endParaRPr lang="en-US"/>
           </a:p>
         </c:txPr>
-        <c:crossAx val="-1875897536"/>
+        <c:crossAx val="123915312"/>
         <c:crosses val="autoZero"/>
         <c:crossBetween val="between"/>
       </c:valAx>
@@ -481,7 +486,7 @@
 </file>
 
 <file path=ppt/charts/chart2.xml><?xml version="1.0" encoding="utf-8"?>
-<c:chartSpace xmlns:c="http://schemas.openxmlformats.org/drawingml/2006/chart" xmlns:a="http://schemas.openxmlformats.org/drawingml/2006/main" xmlns:r="http://schemas.openxmlformats.org/officeDocument/2006/relationships">
+<c:chartSpace xmlns:c="http://schemas.openxmlformats.org/drawingml/2006/chart" xmlns:a="http://schemas.openxmlformats.org/drawingml/2006/main" xmlns:r="http://schemas.openxmlformats.org/officeDocument/2006/relationships" xmlns:c16r2="http://schemas.microsoft.com/office/drawing/2015/06/chart">
   <c:date1904 val="0"/>
   <c:lang val="en-US"/>
   <c:roundedCorners val="0"/>
@@ -544,23 +549,28 @@
                 <c:formatCode>General</c:formatCode>
                 <c:ptCount val="5"/>
                 <c:pt idx="0">
-                  <c:v>0.757142857142857</c:v>
+                  <c:v>0.75714285714285723</c:v>
                 </c:pt>
                 <c:pt idx="1">
-                  <c:v>0.771428571428572</c:v>
+                  <c:v>0.77142857142857146</c:v>
                 </c:pt>
                 <c:pt idx="2">
-                  <c:v>0.771428571428572</c:v>
+                  <c:v>0.77142857142857146</c:v>
                 </c:pt>
                 <c:pt idx="3">
-                  <c:v>0.785714285714286</c:v>
+                  <c:v>0.7857142857142857</c:v>
                 </c:pt>
                 <c:pt idx="4">
-                  <c:v>0.728571428571429</c:v>
+                  <c:v>0.72857142857142865</c:v>
                 </c:pt>
               </c:numCache>
             </c:numRef>
           </c:val>
+          <c:extLst>
+            <c:ext xmlns:c16="http://schemas.microsoft.com/office/drawing/2014/chart" uri="{C3380CC4-5D6E-409C-BE32-E72D297353CC}">
+              <c16:uniqueId val="{00000000-B852-40B0-AC25-CCABA80A1B19}"/>
+            </c:ext>
+          </c:extLst>
         </c:ser>
         <c:dLbls>
           <c:showLegendKey val="0"/>
@@ -572,11 +582,11 @@
         </c:dLbls>
         <c:gapWidth val="219"/>
         <c:overlap val="-27"/>
-        <c:axId val="-1864270288"/>
-        <c:axId val="-1864901344"/>
+        <c:axId val="169035712"/>
+        <c:axId val="169036272"/>
       </c:barChart>
       <c:catAx>
-        <c:axId val="-1864270288"/>
+        <c:axId val="169035712"/>
         <c:scaling>
           <c:orientation val="minMax"/>
         </c:scaling>
@@ -612,8 +622,8 @@
             <c:manualLayout>
               <c:xMode val="edge"/>
               <c:yMode val="edge"/>
-              <c:x val="0.459680318208164"/>
-              <c:y val="0.911194460180614"/>
+              <c:x val="0.45968031820816396"/>
+              <c:y val="0.91119446018061356"/>
             </c:manualLayout>
           </c:layout>
           <c:overlay val="0"/>
@@ -682,7 +692,7 @@
             <a:endParaRPr lang="en-US"/>
           </a:p>
         </c:txPr>
-        <c:crossAx val="-1864901344"/>
+        <c:crossAx val="169036272"/>
         <c:crosses val="autoZero"/>
         <c:auto val="1"/>
         <c:lblAlgn val="ctr"/>
@@ -690,7 +700,7 @@
         <c:noMultiLvlLbl val="0"/>
       </c:catAx>
       <c:valAx>
-        <c:axId val="-1864901344"/>
+        <c:axId val="169036272"/>
         <c:scaling>
           <c:orientation val="minMax"/>
         </c:scaling>
@@ -796,7 +806,7 @@
             <a:endParaRPr lang="en-US"/>
           </a:p>
         </c:txPr>
-        <c:crossAx val="-1864270288"/>
+        <c:crossAx val="169035712"/>
         <c:crosses val="autoZero"/>
         <c:crossBetween val="between"/>
       </c:valAx>
@@ -839,7 +849,7 @@
 </file>
 
 <file path=ppt/charts/chart3.xml><?xml version="1.0" encoding="utf-8"?>
-<c:chartSpace xmlns:c="http://schemas.openxmlformats.org/drawingml/2006/chart" xmlns:a="http://schemas.openxmlformats.org/drawingml/2006/main" xmlns:r="http://schemas.openxmlformats.org/officeDocument/2006/relationships">
+<c:chartSpace xmlns:c="http://schemas.openxmlformats.org/drawingml/2006/chart" xmlns:a="http://schemas.openxmlformats.org/drawingml/2006/main" xmlns:r="http://schemas.openxmlformats.org/officeDocument/2006/relationships" xmlns:c16r2="http://schemas.microsoft.com/office/drawing/2015/06/chart">
   <c:date1904 val="0"/>
   <c:lang val="en-US"/>
   <c:roundedCorners val="0"/>
@@ -906,23 +916,28 @@
                 <c:formatCode>General</c:formatCode>
                 <c:ptCount val="5"/>
                 <c:pt idx="0">
-                  <c:v>1.0</c:v>
+                  <c:v>1</c:v>
                 </c:pt>
                 <c:pt idx="1">
-                  <c:v>2.0</c:v>
+                  <c:v>2</c:v>
                 </c:pt>
                 <c:pt idx="2">
-                  <c:v>0.0</c:v>
+                  <c:v>0</c:v>
                 </c:pt>
                 <c:pt idx="3">
-                  <c:v>1.0</c:v>
+                  <c:v>1</c:v>
                 </c:pt>
                 <c:pt idx="4">
-                  <c:v>0.0</c:v>
+                  <c:v>0</c:v>
                 </c:pt>
               </c:numCache>
             </c:numRef>
           </c:val>
+          <c:extLst>
+            <c:ext xmlns:c16="http://schemas.microsoft.com/office/drawing/2014/chart" uri="{C3380CC4-5D6E-409C-BE32-E72D297353CC}">
+              <c16:uniqueId val="{00000000-EE6C-4685-BD50-6A185EC2F838}"/>
+            </c:ext>
+          </c:extLst>
         </c:ser>
         <c:ser>
           <c:idx val="1"/>
@@ -947,23 +962,28 @@
                 <c:formatCode>General</c:formatCode>
                 <c:ptCount val="5"/>
                 <c:pt idx="0">
-                  <c:v>0.0</c:v>
+                  <c:v>0</c:v>
                 </c:pt>
                 <c:pt idx="1">
-                  <c:v>3.0</c:v>
+                  <c:v>3</c:v>
                 </c:pt>
                 <c:pt idx="2">
-                  <c:v>0.0</c:v>
+                  <c:v>0</c:v>
                 </c:pt>
                 <c:pt idx="3">
-                  <c:v>1.0</c:v>
+                  <c:v>1</c:v>
                 </c:pt>
                 <c:pt idx="4">
-                  <c:v>0.0</c:v>
+                  <c:v>0</c:v>
                 </c:pt>
               </c:numCache>
             </c:numRef>
           </c:val>
+          <c:extLst>
+            <c:ext xmlns:c16="http://schemas.microsoft.com/office/drawing/2014/chart" uri="{C3380CC4-5D6E-409C-BE32-E72D297353CC}">
+              <c16:uniqueId val="{00000001-EE6C-4685-BD50-6A185EC2F838}"/>
+            </c:ext>
+          </c:extLst>
         </c:ser>
         <c:ser>
           <c:idx val="2"/>
@@ -988,23 +1008,28 @@
                 <c:formatCode>General</c:formatCode>
                 <c:ptCount val="5"/>
                 <c:pt idx="0">
-                  <c:v>1.0</c:v>
+                  <c:v>1</c:v>
                 </c:pt>
                 <c:pt idx="1">
-                  <c:v>1.0</c:v>
+                  <c:v>1</c:v>
                 </c:pt>
                 <c:pt idx="2">
-                  <c:v>0.0</c:v>
+                  <c:v>0</c:v>
                 </c:pt>
                 <c:pt idx="3">
-                  <c:v>2.0</c:v>
+                  <c:v>2</c:v>
                 </c:pt>
                 <c:pt idx="4">
-                  <c:v>0.0</c:v>
+                  <c:v>0</c:v>
                 </c:pt>
               </c:numCache>
             </c:numRef>
           </c:val>
+          <c:extLst>
+            <c:ext xmlns:c16="http://schemas.microsoft.com/office/drawing/2014/chart" uri="{C3380CC4-5D6E-409C-BE32-E72D297353CC}">
+              <c16:uniqueId val="{00000002-EE6C-4685-BD50-6A185EC2F838}"/>
+            </c:ext>
+          </c:extLst>
         </c:ser>
         <c:ser>
           <c:idx val="3"/>
@@ -1029,23 +1054,28 @@
                 <c:formatCode>General</c:formatCode>
                 <c:ptCount val="5"/>
                 <c:pt idx="0">
-                  <c:v>2.0</c:v>
+                  <c:v>2</c:v>
                 </c:pt>
                 <c:pt idx="1">
-                  <c:v>0.0</c:v>
+                  <c:v>0</c:v>
                 </c:pt>
                 <c:pt idx="2">
-                  <c:v>1.0</c:v>
+                  <c:v>1</c:v>
                 </c:pt>
                 <c:pt idx="3">
-                  <c:v>0.0</c:v>
+                  <c:v>0</c:v>
                 </c:pt>
                 <c:pt idx="4">
-                  <c:v>1.0</c:v>
+                  <c:v>1</c:v>
                 </c:pt>
               </c:numCache>
             </c:numRef>
           </c:val>
+          <c:extLst>
+            <c:ext xmlns:c16="http://schemas.microsoft.com/office/drawing/2014/chart" uri="{C3380CC4-5D6E-409C-BE32-E72D297353CC}">
+              <c16:uniqueId val="{00000003-EE6C-4685-BD50-6A185EC2F838}"/>
+            </c:ext>
+          </c:extLst>
         </c:ser>
         <c:ser>
           <c:idx val="4"/>
@@ -1070,23 +1100,28 @@
                 <c:formatCode>General</c:formatCode>
                 <c:ptCount val="5"/>
                 <c:pt idx="0">
-                  <c:v>2.0</c:v>
+                  <c:v>2</c:v>
                 </c:pt>
                 <c:pt idx="1">
-                  <c:v>1.0</c:v>
+                  <c:v>1</c:v>
                 </c:pt>
                 <c:pt idx="2">
-                  <c:v>0.0</c:v>
+                  <c:v>0</c:v>
                 </c:pt>
                 <c:pt idx="3">
-                  <c:v>1.0</c:v>
+                  <c:v>1</c:v>
                 </c:pt>
                 <c:pt idx="4">
-                  <c:v>0.0</c:v>
+                  <c:v>0</c:v>
                 </c:pt>
               </c:numCache>
             </c:numRef>
           </c:val>
+          <c:extLst>
+            <c:ext xmlns:c16="http://schemas.microsoft.com/office/drawing/2014/chart" uri="{C3380CC4-5D6E-409C-BE32-E72D297353CC}">
+              <c16:uniqueId val="{00000004-EE6C-4685-BD50-6A185EC2F838}"/>
+            </c:ext>
+          </c:extLst>
         </c:ser>
         <c:ser>
           <c:idx val="5"/>
@@ -1111,23 +1146,28 @@
                 <c:formatCode>General</c:formatCode>
                 <c:ptCount val="5"/>
                 <c:pt idx="0">
-                  <c:v>3.0</c:v>
+                  <c:v>3</c:v>
                 </c:pt>
                 <c:pt idx="1">
-                  <c:v>1.0</c:v>
+                  <c:v>1</c:v>
                 </c:pt>
                 <c:pt idx="2">
-                  <c:v>0.0</c:v>
+                  <c:v>0</c:v>
                 </c:pt>
                 <c:pt idx="3">
-                  <c:v>0.0</c:v>
+                  <c:v>0</c:v>
                 </c:pt>
                 <c:pt idx="4">
-                  <c:v>0.0</c:v>
+                  <c:v>0</c:v>
                 </c:pt>
               </c:numCache>
             </c:numRef>
           </c:val>
+          <c:extLst>
+            <c:ext xmlns:c16="http://schemas.microsoft.com/office/drawing/2014/chart" uri="{C3380CC4-5D6E-409C-BE32-E72D297353CC}">
+              <c16:uniqueId val="{00000005-EE6C-4685-BD50-6A185EC2F838}"/>
+            </c:ext>
+          </c:extLst>
         </c:ser>
         <c:dLbls>
           <c:showLegendKey val="0"/>
@@ -1139,11 +1179,11 @@
         </c:dLbls>
         <c:gapWidth val="219"/>
         <c:overlap val="-27"/>
-        <c:axId val="-1865887968"/>
-        <c:axId val="-1860563728"/>
+        <c:axId val="172552352"/>
+        <c:axId val="172552912"/>
       </c:barChart>
       <c:catAx>
-        <c:axId val="-1865887968"/>
+        <c:axId val="172552352"/>
         <c:scaling>
           <c:orientation val="minMax"/>
         </c:scaling>
@@ -1186,7 +1226,7 @@
             <a:endParaRPr lang="en-US"/>
           </a:p>
         </c:txPr>
-        <c:crossAx val="-1860563728"/>
+        <c:crossAx val="172552912"/>
         <c:crosses val="autoZero"/>
         <c:auto val="1"/>
         <c:lblAlgn val="ctr"/>
@@ -1194,7 +1234,7 @@
         <c:noMultiLvlLbl val="0"/>
       </c:catAx>
       <c:valAx>
-        <c:axId val="-1860563728"/>
+        <c:axId val="172552912"/>
         <c:scaling>
           <c:orientation val="minMax"/>
         </c:scaling>
@@ -1240,7 +1280,6 @@
               </a:p>
             </c:rich>
           </c:tx>
-          <c:layout/>
           <c:overlay val="0"/>
           <c:spPr>
             <a:noFill/>
@@ -1301,10 +1340,10 @@
             <a:endParaRPr lang="en-US"/>
           </a:p>
         </c:txPr>
-        <c:crossAx val="-1865887968"/>
+        <c:crossAx val="172552352"/>
         <c:crosses val="autoZero"/>
         <c:crossBetween val="between"/>
-        <c:majorUnit val="1.0"/>
+        <c:majorUnit val="1"/>
       </c:valAx>
       <c:spPr>
         <a:noFill/>
@@ -1316,7 +1355,6 @@
     </c:plotArea>
     <c:legend>
       <c:legendPos val="r"/>
-      <c:layout/>
       <c:overlay val="0"/>
       <c:spPr>
         <a:noFill/>
@@ -1377,7 +1415,7 @@
 </file>
 
 <file path=ppt/charts/chart4.xml><?xml version="1.0" encoding="utf-8"?>
-<c:chartSpace xmlns:c="http://schemas.openxmlformats.org/drawingml/2006/chart" xmlns:a="http://schemas.openxmlformats.org/drawingml/2006/main" xmlns:r="http://schemas.openxmlformats.org/officeDocument/2006/relationships">
+<c:chartSpace xmlns:c="http://schemas.openxmlformats.org/drawingml/2006/chart" xmlns:a="http://schemas.openxmlformats.org/drawingml/2006/main" xmlns:r="http://schemas.openxmlformats.org/officeDocument/2006/relationships" xmlns:c16r2="http://schemas.microsoft.com/office/drawing/2015/06/chart">
   <c:date1904 val="0"/>
   <c:lang val="en-US"/>
   <c:roundedCorners val="0"/>
@@ -1453,10 +1491,10 @@
                   <c:v>2.5</c:v>
                 </c:pt>
                 <c:pt idx="3">
-                  <c:v>2.0</c:v>
+                  <c:v>2</c:v>
                 </c:pt>
                 <c:pt idx="4">
-                  <c:v>2.0</c:v>
+                  <c:v>2</c:v>
                 </c:pt>
                 <c:pt idx="5">
                   <c:v>1.25</c:v>
@@ -1464,6 +1502,11 @@
               </c:numCache>
             </c:numRef>
           </c:val>
+          <c:extLst>
+            <c:ext xmlns:c16="http://schemas.microsoft.com/office/drawing/2014/chart" uri="{C3380CC4-5D6E-409C-BE32-E72D297353CC}">
+              <c16:uniqueId val="{00000000-7D9F-4BDF-A5FD-B96FE5724E8E}"/>
+            </c:ext>
+          </c:extLst>
         </c:ser>
         <c:dLbls>
           <c:showLegendKey val="0"/>
@@ -1475,11 +1518,11 @@
         </c:dLbls>
         <c:gapWidth val="219"/>
         <c:overlap val="-27"/>
-        <c:axId val="-1876685296"/>
-        <c:axId val="-1876637024"/>
+        <c:axId val="168850592"/>
+        <c:axId val="168860672"/>
       </c:barChart>
       <c:catAx>
-        <c:axId val="-1876685296"/>
+        <c:axId val="168850592"/>
         <c:scaling>
           <c:orientation val="minMax"/>
         </c:scaling>
@@ -1511,7 +1554,6 @@
               </a:p>
             </c:rich>
           </c:tx>
-          <c:layout/>
           <c:overlay val="0"/>
           <c:spPr>
             <a:noFill/>
@@ -1578,7 +1620,7 @@
             <a:endParaRPr lang="en-US"/>
           </a:p>
         </c:txPr>
-        <c:crossAx val="-1876637024"/>
+        <c:crossAx val="168860672"/>
         <c:crosses val="autoZero"/>
         <c:auto val="1"/>
         <c:lblAlgn val="ctr"/>
@@ -1586,7 +1628,7 @@
         <c:noMultiLvlLbl val="0"/>
       </c:catAx>
       <c:valAx>
-        <c:axId val="-1876637024"/>
+        <c:axId val="168860672"/>
         <c:scaling>
           <c:orientation val="minMax"/>
         </c:scaling>
@@ -1632,7 +1674,6 @@
               </a:p>
             </c:rich>
           </c:tx>
-          <c:layout/>
           <c:overlay val="0"/>
           <c:spPr>
             <a:noFill/>
@@ -1693,7 +1734,7 @@
             <a:endParaRPr lang="en-US"/>
           </a:p>
         </c:txPr>
-        <c:crossAx val="-1876685296"/>
+        <c:crossAx val="168850592"/>
         <c:crosses val="autoZero"/>
         <c:crossBetween val="between"/>
       </c:valAx>
@@ -4075,7 +4116,7 @@
           <a:p>
             <a:fld id="{BC58CC46-0132-4CEE-ABDB-36235E875E40}" type="datetimeFigureOut">
               <a:rPr lang="en-US" smtClean="0"/>
-              <a:t>12/9/16</a:t>
+              <a:t>12/9/2016</a:t>
             </a:fld>
             <a:endParaRPr lang="en-US"/>
           </a:p>
@@ -4303,7 +4344,7 @@
           <a:p>
             <a:fld id="{BC58CC46-0132-4CEE-ABDB-36235E875E40}" type="datetimeFigureOut">
               <a:rPr lang="en-US" smtClean="0"/>
-              <a:t>12/9/16</a:t>
+              <a:t>12/9/2016</a:t>
             </a:fld>
             <a:endParaRPr lang="en-US"/>
           </a:p>
@@ -4483,7 +4524,7 @@
           <a:p>
             <a:fld id="{BC58CC46-0132-4CEE-ABDB-36235E875E40}" type="datetimeFigureOut">
               <a:rPr lang="en-US" smtClean="0"/>
-              <a:t>12/9/16</a:t>
+              <a:t>12/9/2016</a:t>
             </a:fld>
             <a:endParaRPr lang="en-US"/>
           </a:p>
@@ -4653,7 +4694,7 @@
           <a:p>
             <a:fld id="{BC58CC46-0132-4CEE-ABDB-36235E875E40}" type="datetimeFigureOut">
               <a:rPr lang="en-US" smtClean="0"/>
-              <a:t>12/9/16</a:t>
+              <a:t>12/9/2016</a:t>
             </a:fld>
             <a:endParaRPr lang="en-US"/>
           </a:p>
@@ -4907,7 +4948,7 @@
           <a:p>
             <a:fld id="{BC58CC46-0132-4CEE-ABDB-36235E875E40}" type="datetimeFigureOut">
               <a:rPr lang="en-US" smtClean="0"/>
-              <a:t>12/9/16</a:t>
+              <a:t>12/9/2016</a:t>
             </a:fld>
             <a:endParaRPr lang="en-US"/>
           </a:p>
@@ -5233,7 +5274,7 @@
           <a:p>
             <a:fld id="{BC58CC46-0132-4CEE-ABDB-36235E875E40}" type="datetimeFigureOut">
               <a:rPr lang="en-US" smtClean="0"/>
-              <a:t>12/9/16</a:t>
+              <a:t>12/9/2016</a:t>
             </a:fld>
             <a:endParaRPr lang="en-US"/>
           </a:p>
@@ -5684,7 +5725,7 @@
           <a:p>
             <a:fld id="{BC58CC46-0132-4CEE-ABDB-36235E875E40}" type="datetimeFigureOut">
               <a:rPr lang="en-US" smtClean="0"/>
-              <a:t>12/9/16</a:t>
+              <a:t>12/9/2016</a:t>
             </a:fld>
             <a:endParaRPr lang="en-US"/>
           </a:p>
@@ -5802,7 +5843,7 @@
           <a:p>
             <a:fld id="{BC58CC46-0132-4CEE-ABDB-36235E875E40}" type="datetimeFigureOut">
               <a:rPr lang="en-US" smtClean="0"/>
-              <a:t>12/9/16</a:t>
+              <a:t>12/9/2016</a:t>
             </a:fld>
             <a:endParaRPr lang="en-US"/>
           </a:p>
@@ -5897,7 +5938,7 @@
           <a:p>
             <a:fld id="{BC58CC46-0132-4CEE-ABDB-36235E875E40}" type="datetimeFigureOut">
               <a:rPr lang="en-US" smtClean="0"/>
-              <a:t>12/9/16</a:t>
+              <a:t>12/9/2016</a:t>
             </a:fld>
             <a:endParaRPr lang="en-US"/>
           </a:p>
@@ -6184,7 +6225,7 @@
           <a:p>
             <a:fld id="{BC58CC46-0132-4CEE-ABDB-36235E875E40}" type="datetimeFigureOut">
               <a:rPr lang="en-US" smtClean="0"/>
-              <a:t>12/9/16</a:t>
+              <a:t>12/9/2016</a:t>
             </a:fld>
             <a:endParaRPr lang="en-US"/>
           </a:p>
@@ -6506,7 +6547,7 @@
           <a:p>
             <a:fld id="{BC58CC46-0132-4CEE-ABDB-36235E875E40}" type="datetimeFigureOut">
               <a:rPr lang="en-US" smtClean="0"/>
-              <a:t>12/9/16</a:t>
+              <a:t>12/9/2016</a:t>
             </a:fld>
             <a:endParaRPr lang="en-US"/>
           </a:p>
@@ -6760,7 +6801,7 @@
           <a:p>
             <a:fld id="{BC58CC46-0132-4CEE-ABDB-36235E875E40}" type="datetimeFigureOut">
               <a:rPr lang="en-US" smtClean="0"/>
-              <a:t>12/9/16</a:t>
+              <a:t>12/9/2016</a:t>
             </a:fld>
             <a:endParaRPr lang="en-US"/>
           </a:p>
@@ -7398,46 +7439,38 @@
               <a:p>
                 <a:r>
                   <a:rPr lang="en-US" dirty="0"/>
-                  <a:t>Goal: </a:t>
-                </a:r>
-                <a:r>
-                  <a:rPr lang="en-US" dirty="0" smtClean="0"/>
-                  <a:t>Determining the </a:t>
-                </a:r>
-                <a:r>
-                  <a:rPr lang="en-US" dirty="0"/>
-                  <a:t>reasonable word spacing amount:</a:t>
+                  <a:t>Goal: Determining the reasonable word spacing amount:</a:t>
                 </a:r>
               </a:p>
               <a:p>
                 <a:r>
-                  <a:rPr lang="en-US" dirty="0" smtClean="0"/>
+                  <a:rPr lang="en-US" dirty="0"/>
                   <a:t>7 different text box sizes were selected for the tests:</a:t>
                 </a:r>
               </a:p>
               <a:p>
                 <a:pPr lvl="1"/>
                 <a:r>
-                  <a:rPr lang="en-US" dirty="0" smtClean="0"/>
+                  <a:rPr lang="en-US" dirty="0"/>
                   <a:t>9 * 9, 11 * 11, 13 * 13</a:t>
                 </a:r>
               </a:p>
               <a:p>
                 <a:pPr lvl="1"/>
                 <a:r>
-                  <a:rPr lang="en-US" dirty="0" smtClean="0"/>
+                  <a:rPr lang="en-US" dirty="0"/>
                   <a:t>9 * 15, 9 * 17, 9 * 19, 9 * 23</a:t>
                 </a:r>
               </a:p>
               <a:p>
                 <a:r>
-                  <a:rPr lang="en-US" dirty="0" smtClean="0"/>
+                  <a:rPr lang="en-US" dirty="0"/>
                   <a:t>4 people, 2 tests for each size</a:t>
                 </a:r>
               </a:p>
               <a:p>
                 <a:r>
-                  <a:rPr lang="en-US" dirty="0" smtClean="0"/>
+                  <a:rPr lang="en-US" dirty="0"/>
                   <a:t>Using random number for selections</a:t>
                 </a:r>
               </a:p>
@@ -7460,7 +7493,7 @@
                       <m:fPr>
                         <m:ctrlPr>
                           <a:rPr lang="en-US" i="1">
-                            <a:latin typeface="Cambria Math" charset="0"/>
+                            <a:latin typeface="Cambria Math" panose="02040503050406030204" pitchFamily="18" charset="0"/>
                           </a:rPr>
                         </m:ctrlPr>
                       </m:fPr>
@@ -7543,13 +7576,13 @@
                     </m:f>
                   </m:oMath>
                 </a14:m>
-                <a:endParaRPr lang="en-US" dirty="0" smtClean="0"/>
+                <a:endParaRPr lang="en-US" dirty="0"/>
               </a:p>
               <a:p>
-                <a:endParaRPr lang="en-US" dirty="0" smtClean="0"/>
+                <a:endParaRPr lang="en-US" dirty="0"/>
               </a:p>
               <a:p>
-                <a:endParaRPr lang="en-US" dirty="0" smtClean="0"/>
+                <a:endParaRPr lang="en-US" dirty="0"/>
               </a:p>
               <a:p>
                 <a:endParaRPr lang="en-US" dirty="0"/>
@@ -7701,15 +7734,15 @@
           <a:lstStyle/>
           <a:p>
             <a:r>
-              <a:rPr lang="en-US" altLang="zh-CN" dirty="0" smtClean="0"/>
+              <a:rPr lang="en-US" altLang="zh-CN" dirty="0"/>
               <a:t>Hit</a:t>
             </a:r>
             <a:r>
-              <a:rPr lang="zh-CN" altLang="en-US" dirty="0" smtClean="0"/>
+              <a:rPr lang="zh-CN" altLang="en-US" dirty="0"/>
               <a:t> </a:t>
             </a:r>
             <a:r>
-              <a:rPr lang="en-US" altLang="zh-CN" dirty="0" smtClean="0"/>
+              <a:rPr lang="en-US" altLang="zh-CN" dirty="0"/>
               <a:t>Table</a:t>
             </a:r>
             <a:endParaRPr lang="en-US" dirty="0"/>
@@ -7815,13 +7848,6 @@
   <p:clrMapOvr>
     <a:masterClrMapping/>
   </p:clrMapOvr>
-  <p:timing>
-    <p:tnLst>
-      <p:par>
-        <p:cTn id="1" dur="indefinite" restart="never" nodeType="tmRoot"/>
-      </p:par>
-    </p:tnLst>
-  </p:timing>
 </p:sld>
 </file>
 
@@ -7858,15 +7884,15 @@
           <a:lstStyle/>
           <a:p>
             <a:r>
-              <a:rPr lang="en-US" altLang="zh-CN" dirty="0" smtClean="0"/>
+              <a:rPr lang="en-US" altLang="zh-CN" dirty="0"/>
               <a:t>Miss</a:t>
             </a:r>
             <a:r>
-              <a:rPr lang="zh-CN" altLang="en-US" dirty="0" smtClean="0"/>
+              <a:rPr lang="zh-CN" altLang="en-US" dirty="0"/>
               <a:t> </a:t>
             </a:r>
             <a:r>
-              <a:rPr lang="en-US" altLang="zh-CN" dirty="0" smtClean="0"/>
+              <a:rPr lang="en-US" altLang="zh-CN" dirty="0"/>
               <a:t>Table</a:t>
             </a:r>
             <a:endParaRPr lang="en-US" dirty="0"/>
@@ -7972,13 +7998,6 @@
   <p:clrMapOvr>
     <a:masterClrMapping/>
   </p:clrMapOvr>
-  <p:timing>
-    <p:tnLst>
-      <p:par>
-        <p:cTn id="1" dur="indefinite" restart="never" nodeType="tmRoot"/>
-      </p:par>
-    </p:tnLst>
-  </p:timing>
 </p:sld>
 </file>
 
@@ -8028,15 +8047,15 @@
               <a:t> </a:t>
             </a:r>
             <a:r>
-              <a:rPr lang="en-US" altLang="zh-CN" dirty="0" smtClean="0"/>
+              <a:rPr lang="en-US" altLang="zh-CN" dirty="0"/>
               <a:t>Table</a:t>
             </a:r>
             <a:r>
-              <a:rPr lang="zh-CN" altLang="en-US" dirty="0" smtClean="0"/>
+              <a:rPr lang="zh-CN" altLang="en-US" dirty="0"/>
               <a:t> </a:t>
             </a:r>
             <a:r>
-              <a:rPr lang="en-US" altLang="zh-CN" dirty="0" smtClean="0"/>
+              <a:rPr lang="en-US" altLang="zh-CN" dirty="0"/>
               <a:t>Comparison</a:t>
             </a:r>
             <a:endParaRPr lang="en-US" dirty="0"/>
@@ -8232,13 +8251,6 @@
   <p:clrMapOvr>
     <a:masterClrMapping/>
   </p:clrMapOvr>
-  <p:timing>
-    <p:tnLst>
-      <p:par>
-        <p:cTn id="1" dur="indefinite" restart="never" nodeType="tmRoot"/>
-      </p:par>
-    </p:tnLst>
-  </p:timing>
 </p:sld>
 </file>
 
@@ -8288,16 +8300,8 @@
               <a:t> </a:t>
             </a:r>
             <a:r>
-              <a:rPr lang="en-US" altLang="zh-CN" dirty="0" smtClean="0"/>
+              <a:rPr lang="en-US" altLang="zh-CN" dirty="0"/>
               <a:t>Table</a:t>
-            </a:r>
-            <a:r>
-              <a:rPr lang="zh-CN" altLang="en-US" dirty="0" smtClean="0"/>
-              <a:t> </a:t>
-            </a:r>
-            <a:r>
-              <a:rPr lang="en-US" altLang="zh-CN" smtClean="0"/>
-              <a:t>Comparison</a:t>
             </a:r>
             <a:endParaRPr lang="en-US" dirty="0"/>
           </a:p>
@@ -8492,13 +8496,6 @@
   <p:clrMapOvr>
     <a:masterClrMapping/>
   </p:clrMapOvr>
-  <p:timing>
-    <p:tnLst>
-      <p:par>
-        <p:cTn id="1" dur="indefinite" restart="never" nodeType="tmRoot"/>
-      </p:par>
-    </p:tnLst>
-  </p:timing>
 </p:sld>
 </file>
 
@@ -8535,10 +8532,9 @@
           <a:lstStyle/>
           <a:p>
             <a:r>
-              <a:rPr lang="en-US" dirty="0" smtClean="0"/>
+              <a:rPr lang="en-US" dirty="0"/>
               <a:t>Experimentation for the Textbox Size </a:t>
             </a:r>
-            <a:endParaRPr lang="en-US" dirty="0"/>
           </a:p>
         </p:txBody>
       </p:sp>
@@ -8650,7 +8646,7 @@
           <a:lstStyle/>
           <a:p>
             <a:r>
-              <a:rPr lang="en-US" dirty="0" smtClean="0"/>
+              <a:rPr lang="en-US" dirty="0"/>
               <a:t>The reasons of result variability</a:t>
             </a:r>
           </a:p>
@@ -8660,42 +8656,8 @@
               <a:buAutoNum type="arabicPeriod"/>
             </a:pPr>
             <a:r>
-              <a:rPr lang="en-US" dirty="0" smtClean="0"/>
+              <a:rPr lang="en-US" dirty="0"/>
               <a:t>User learning process during the tests</a:t>
-            </a:r>
-          </a:p>
-          <a:p>
-            <a:pPr marL="617220" lvl="1" indent="-342900">
-              <a:buFont typeface="+mj-lt"/>
-              <a:buAutoNum type="arabicPeriod"/>
-            </a:pPr>
-            <a:endParaRPr lang="en-US" dirty="0" smtClean="0"/>
-          </a:p>
-          <a:p>
-            <a:pPr marL="617220" lvl="1" indent="-342900">
-              <a:buFont typeface="+mj-lt"/>
-              <a:buAutoNum type="arabicPeriod"/>
-            </a:pPr>
-            <a:r>
-              <a:rPr lang="en-US" dirty="0" smtClean="0"/>
-              <a:t>High sensitivity  of the calibration process</a:t>
-            </a:r>
-          </a:p>
-          <a:p>
-            <a:pPr marL="617220" lvl="1" indent="-342900">
-              <a:buFont typeface="+mj-lt"/>
-              <a:buAutoNum type="arabicPeriod"/>
-            </a:pPr>
-            <a:endParaRPr lang="en-US" dirty="0" smtClean="0"/>
-          </a:p>
-          <a:p>
-            <a:pPr marL="617220" lvl="1" indent="-342900">
-              <a:buFont typeface="+mj-lt"/>
-              <a:buAutoNum type="arabicPeriod"/>
-            </a:pPr>
-            <a:r>
-              <a:rPr lang="en-US" dirty="0" smtClean="0"/>
-              <a:t>limited number of the experiments</a:t>
             </a:r>
           </a:p>
           <a:p>
@@ -8711,29 +8673,8 @@
               <a:buAutoNum type="arabicPeriod"/>
             </a:pPr>
             <a:r>
-              <a:rPr lang="en-US" dirty="0" smtClean="0"/>
-              <a:t>People with individual differences:</a:t>
-            </a:r>
-          </a:p>
-          <a:p>
-            <a:pPr lvl="2"/>
-            <a:r>
-              <a:rPr lang="en-US" dirty="0" smtClean="0"/>
-              <a:t>Glasses </a:t>
-            </a:r>
-          </a:p>
-          <a:p>
-            <a:pPr lvl="2"/>
-            <a:r>
-              <a:rPr lang="en-US" dirty="0" smtClean="0"/>
-              <a:t>Contact lenses</a:t>
-            </a:r>
-          </a:p>
-          <a:p>
-            <a:pPr lvl="2"/>
-            <a:r>
-              <a:rPr lang="en-US" dirty="0" smtClean="0"/>
-              <a:t>Eye shapes</a:t>
+              <a:rPr lang="en-US" dirty="0"/>
+              <a:t>High sensitivity  of the calibration process</a:t>
             </a:r>
           </a:p>
           <a:p>
@@ -8741,13 +8682,72 @@
               <a:buFont typeface="+mj-lt"/>
               <a:buAutoNum type="arabicPeriod"/>
             </a:pPr>
-            <a:endParaRPr lang="en-US" dirty="0" smtClean="0"/>
-          </a:p>
-          <a:p>
-            <a:endParaRPr lang="en-US" dirty="0" smtClean="0"/>
-          </a:p>
-          <a:p>
-            <a:endParaRPr lang="en-US" dirty="0" smtClean="0"/>
+            <a:endParaRPr lang="en-US" dirty="0"/>
+          </a:p>
+          <a:p>
+            <a:pPr marL="617220" lvl="1" indent="-342900">
+              <a:buFont typeface="+mj-lt"/>
+              <a:buAutoNum type="arabicPeriod"/>
+            </a:pPr>
+            <a:r>
+              <a:rPr lang="en-US"/>
+              <a:t>Limited </a:t>
+            </a:r>
+            <a:r>
+              <a:rPr lang="en-US" dirty="0"/>
+              <a:t>number of the experiments</a:t>
+            </a:r>
+          </a:p>
+          <a:p>
+            <a:pPr marL="617220" lvl="1" indent="-342900">
+              <a:buFont typeface="+mj-lt"/>
+              <a:buAutoNum type="arabicPeriod"/>
+            </a:pPr>
+            <a:endParaRPr lang="en-US" dirty="0"/>
+          </a:p>
+          <a:p>
+            <a:pPr marL="617220" lvl="1" indent="-342900">
+              <a:buFont typeface="+mj-lt"/>
+              <a:buAutoNum type="arabicPeriod"/>
+            </a:pPr>
+            <a:r>
+              <a:rPr lang="en-US" dirty="0"/>
+              <a:t>People with individual differences:</a:t>
+            </a:r>
+          </a:p>
+          <a:p>
+            <a:pPr lvl="2"/>
+            <a:r>
+              <a:rPr lang="en-US" dirty="0"/>
+              <a:t>Glasses </a:t>
+            </a:r>
+          </a:p>
+          <a:p>
+            <a:pPr lvl="2"/>
+            <a:r>
+              <a:rPr lang="en-US" dirty="0"/>
+              <a:t>Contact lenses</a:t>
+            </a:r>
+          </a:p>
+          <a:p>
+            <a:pPr lvl="2"/>
+            <a:r>
+              <a:rPr lang="en-US" dirty="0"/>
+              <a:t>Eye shapes</a:t>
+            </a:r>
+          </a:p>
+          <a:p>
+            <a:pPr marL="617220" lvl="1" indent="-342900">
+              <a:buFont typeface="+mj-lt"/>
+              <a:buAutoNum type="arabicPeriod"/>
+            </a:pPr>
+            <a:endParaRPr lang="en-US" dirty="0"/>
+          </a:p>
+          <a:p>
+            <a:endParaRPr lang="en-US" dirty="0"/>
+          </a:p>
+          <a:p>
+            <a:endParaRPr lang="en-US" dirty="0"/>
           </a:p>
           <a:p>
             <a:endParaRPr lang="en-US" dirty="0"/>
@@ -8843,38 +8843,13 @@
             <a:pPr lvl="1"/>
             <a:r>
               <a:rPr lang="en-US" dirty="0"/>
-              <a:t>Delay in milliseconds: </a:t>
-            </a:r>
-            <a:r>
-              <a:rPr lang="en-US" dirty="0" smtClean="0"/>
-              <a:t>200</a:t>
-            </a:r>
+              <a:t>Delay in milliseconds: 200, 300, 400, 450, 500, 600</a:t>
+            </a:r>
+          </a:p>
+          <a:p>
             <a:r>
               <a:rPr lang="en-US" dirty="0"/>
-              <a:t>, </a:t>
-            </a:r>
-            <a:r>
-              <a:rPr lang="en-US" dirty="0" smtClean="0"/>
-              <a:t>300</a:t>
-            </a:r>
-            <a:r>
-              <a:rPr lang="en-US" dirty="0"/>
-              <a:t>, </a:t>
-            </a:r>
-            <a:r>
-              <a:rPr lang="en-US" dirty="0" smtClean="0"/>
-              <a:t>400, 450, 500, 600</a:t>
-            </a:r>
-            <a:endParaRPr lang="en-US" dirty="0"/>
-          </a:p>
-          <a:p>
-            <a:r>
-              <a:rPr lang="en-US" dirty="0" smtClean="0"/>
-              <a:t>Participants </a:t>
-            </a:r>
-            <a:r>
-              <a:rPr lang="en-US" dirty="0"/>
-              <a:t>rate user experience on Likert Scale of 1 to 5</a:t>
+              <a:t>Participants rate user experience on Likert Scale of 1 to 5</a:t>
             </a:r>
           </a:p>
           <a:p>
@@ -8887,12 +8862,8 @@
           <a:p>
             <a:pPr lvl="1"/>
             <a:r>
-              <a:rPr lang="en-US" dirty="0" smtClean="0"/>
-              <a:t>Choose </a:t>
-            </a:r>
-            <a:r>
               <a:rPr lang="en-US" dirty="0"/>
-              <a:t>average amount as acceptable delay</a:t>
+              <a:t>Choose average amount as acceptable delay</a:t>
             </a:r>
           </a:p>
         </p:txBody>
@@ -9118,66 +9089,66 @@
           <a:lstStyle/>
           <a:p>
             <a:r>
-              <a:rPr lang="en-US" b="1" dirty="0" smtClean="0"/>
+              <a:rPr lang="en-US" b="1" dirty="0"/>
               <a:t>Description:</a:t>
             </a:r>
           </a:p>
           <a:p>
             <a:pPr lvl="1"/>
             <a:r>
-              <a:rPr lang="en-US" dirty="0" smtClean="0"/>
+              <a:rPr lang="en-US" dirty="0"/>
               <a:t>Develop techniques to convert eye the tracking into the precision text detecting during the reading for children</a:t>
             </a:r>
           </a:p>
           <a:p>
             <a:r>
-              <a:rPr lang="en-US" b="1" dirty="0" smtClean="0"/>
+              <a:rPr lang="en-US" b="1" dirty="0"/>
               <a:t>Input:</a:t>
             </a:r>
           </a:p>
           <a:p>
             <a:pPr lvl="1"/>
             <a:r>
-              <a:rPr lang="en-US" dirty="0" smtClean="0"/>
+              <a:rPr lang="en-US" dirty="0"/>
               <a:t>An environment contains the picture and texts</a:t>
             </a:r>
           </a:p>
           <a:p>
             <a:pPr lvl="1"/>
             <a:r>
-              <a:rPr lang="en-US" dirty="0" smtClean="0"/>
+              <a:rPr lang="en-US" dirty="0"/>
               <a:t>User who wants detect text</a:t>
             </a:r>
           </a:p>
           <a:p>
             <a:pPr lvl="1"/>
             <a:r>
-              <a:rPr lang="en-US" dirty="0" smtClean="0"/>
+              <a:rPr lang="en-US" dirty="0"/>
               <a:t>Eye tracker</a:t>
             </a:r>
           </a:p>
           <a:p>
             <a:r>
-              <a:rPr lang="en-US" b="1" dirty="0" smtClean="0"/>
+              <a:rPr lang="en-US" b="1" dirty="0"/>
               <a:t>Output:</a:t>
             </a:r>
           </a:p>
           <a:p>
             <a:pPr lvl="1"/>
             <a:r>
-              <a:rPr lang="en-US" dirty="0" smtClean="0"/>
+              <a:rPr lang="en-US" dirty="0"/>
               <a:t>Highlighted text</a:t>
             </a:r>
           </a:p>
           <a:p>
             <a:pPr lvl="1"/>
             <a:r>
-              <a:rPr lang="en-US" dirty="0" smtClean="0"/>
+              <a:rPr lang="en-US" dirty="0"/>
               <a:t>Voice of the detected word</a:t>
             </a:r>
           </a:p>
           <a:p>
-            <a:endParaRPr lang="en-US" dirty="0" smtClean="0"/>
+            <a:endParaRPr lang="en-US" dirty="0"/>
           </a:p>
         </p:txBody>
       </p:sp>
@@ -9865,26 +9836,15 @@
           <a:lstStyle/>
           <a:p>
             <a:r>
-              <a:rPr lang="en-US" b="1" dirty="0" smtClean="0"/>
+              <a:rPr lang="en-US" b="1" dirty="0"/>
               <a:t>Technical Challenges:</a:t>
             </a:r>
           </a:p>
           <a:p>
             <a:pPr lvl="1"/>
             <a:r>
-              <a:rPr lang="en-US" b="1" dirty="0" smtClean="0"/>
+              <a:rPr lang="en-US" b="1" dirty="0"/>
               <a:t>How detect eyes continuously and constantly</a:t>
-            </a:r>
-          </a:p>
-          <a:p>
-            <a:pPr lvl="1"/>
-            <a:endParaRPr lang="en-US" b="1" dirty="0" smtClean="0"/>
-          </a:p>
-          <a:p>
-            <a:pPr lvl="1"/>
-            <a:r>
-              <a:rPr lang="en-US" b="1" dirty="0" smtClean="0"/>
-              <a:t>The best way of detecting object (Text)</a:t>
             </a:r>
           </a:p>
           <a:p>
@@ -9894,40 +9854,51 @@
           <a:p>
             <a:pPr lvl="1"/>
             <a:r>
-              <a:rPr lang="en-US" b="1" dirty="0" smtClean="0"/>
+              <a:rPr lang="en-US" b="1" dirty="0"/>
+              <a:t>The best way of detecting object (Text)</a:t>
+            </a:r>
+          </a:p>
+          <a:p>
+            <a:pPr lvl="1"/>
+            <a:endParaRPr lang="en-US" b="1" dirty="0"/>
+          </a:p>
+          <a:p>
+            <a:pPr lvl="1"/>
+            <a:r>
+              <a:rPr lang="en-US" b="1" dirty="0"/>
               <a:t>The limitation of the </a:t>
             </a:r>
             <a:r>
-              <a:rPr lang="en-US" b="1" dirty="0" err="1" smtClean="0"/>
+              <a:rPr lang="en-US" b="1" dirty="0" err="1"/>
               <a:t>Tobii</a:t>
             </a:r>
             <a:r>
-              <a:rPr lang="en-US" b="1" dirty="0" smtClean="0"/>
+              <a:rPr lang="en-US" b="1" dirty="0"/>
               <a:t> eye engine</a:t>
             </a:r>
           </a:p>
           <a:p>
             <a:pPr lvl="1"/>
-            <a:endParaRPr lang="en-US" b="1" dirty="0" smtClean="0"/>
+            <a:endParaRPr lang="en-US" b="1" dirty="0"/>
           </a:p>
           <a:p>
             <a:pPr lvl="1"/>
-            <a:endParaRPr lang="en-US" b="1" dirty="0" smtClean="0"/>
-          </a:p>
-          <a:p>
-            <a:endParaRPr lang="en-US" b="1" dirty="0" smtClean="0"/>
+            <a:endParaRPr lang="en-US" b="1" dirty="0"/>
+          </a:p>
+          <a:p>
+            <a:endParaRPr lang="en-US" b="1" dirty="0"/>
           </a:p>
           <a:p>
             <a:pPr lvl="1"/>
-            <a:endParaRPr lang="en-US" dirty="0" smtClean="0"/>
+            <a:endParaRPr lang="en-US" dirty="0"/>
           </a:p>
           <a:p>
             <a:pPr lvl="1"/>
-            <a:endParaRPr lang="en-US" dirty="0" smtClean="0"/>
+            <a:endParaRPr lang="en-US" dirty="0"/>
           </a:p>
           <a:p>
             <a:pPr lvl="1"/>
-            <a:endParaRPr lang="en-US" dirty="0" smtClean="0"/>
+            <a:endParaRPr lang="en-US" dirty="0"/>
           </a:p>
         </p:txBody>
       </p:sp>
@@ -9983,25 +9954,20 @@
           <a:p>
             <a:r>
               <a:rPr lang="en-US" dirty="0" err="1"/>
-              <a:t>t</a:t>
-            </a:r>
-            <a:r>
-              <a:rPr lang="en-US" dirty="0" err="1" smtClean="0"/>
-              <a:t>obii</a:t>
-            </a:r>
-            <a:r>
-              <a:rPr lang="en-US" dirty="0" smtClean="0"/>
+              <a:t>tobii</a:t>
+            </a:r>
+            <a:r>
+              <a:rPr lang="en-US" dirty="0"/>
               <a:t> </a:t>
             </a:r>
             <a:r>
-              <a:rPr lang="en-US" dirty="0" err="1" smtClean="0"/>
+              <a:rPr lang="en-US" dirty="0" err="1"/>
               <a:t>eyeX</a:t>
             </a:r>
             <a:r>
-              <a:rPr lang="en-US" dirty="0" smtClean="0"/>
+              <a:rPr lang="en-US" dirty="0"/>
               <a:t> Programming</a:t>
             </a:r>
-            <a:endParaRPr lang="en-US" dirty="0"/>
           </a:p>
         </p:txBody>
       </p:sp>
@@ -10061,31 +10027,23 @@
               <a:buChar char="•"/>
             </a:pPr>
             <a:r>
-              <a:rPr lang="en-US" dirty="0" smtClean="0"/>
-              <a:t>Build application </a:t>
-            </a:r>
-            <a:r>
               <a:rPr lang="en-US" dirty="0"/>
-              <a:t>a</a:t>
-            </a:r>
-            <a:r>
-              <a:rPr lang="en-US" dirty="0" smtClean="0"/>
-              <a:t>top </a:t>
-            </a:r>
-            <a:r>
-              <a:rPr lang="en-US" dirty="0" err="1" smtClean="0"/>
+              <a:t>Build application atop </a:t>
+            </a:r>
+            <a:r>
+              <a:rPr lang="en-US" dirty="0" err="1"/>
               <a:t>tobii</a:t>
             </a:r>
             <a:r>
-              <a:rPr lang="en-US" dirty="0" smtClean="0"/>
+              <a:rPr lang="en-US" dirty="0"/>
               <a:t> </a:t>
             </a:r>
             <a:r>
-              <a:rPr lang="en-US" dirty="0" err="1" smtClean="0"/>
+              <a:rPr lang="en-US" dirty="0" err="1"/>
               <a:t>eyeX</a:t>
             </a:r>
             <a:r>
-              <a:rPr lang="en-US" dirty="0" smtClean="0"/>
+              <a:rPr lang="en-US" dirty="0"/>
               <a:t> Engine</a:t>
             </a:r>
           </a:p>
@@ -10097,7 +10055,7 @@
             <a:endParaRPr lang="en-US" dirty="0"/>
           </a:p>
           <a:p>
-            <a:endParaRPr lang="en-US" dirty="0" smtClean="0"/>
+            <a:endParaRPr lang="en-US" dirty="0"/>
           </a:p>
           <a:p>
             <a:pPr marL="342900" indent="-342900">
@@ -10105,7 +10063,7 @@
               <a:buChar char="•"/>
             </a:pPr>
             <a:r>
-              <a:rPr lang="en-US" dirty="0" smtClean="0"/>
+              <a:rPr lang="en-US" dirty="0"/>
               <a:t>Engine API provides only link between 3 systems:</a:t>
             </a:r>
           </a:p>
@@ -10115,7 +10073,7 @@
               <a:buChar char="•"/>
             </a:pPr>
             <a:r>
-              <a:rPr lang="en-US" dirty="0" smtClean="0"/>
+              <a:rPr lang="en-US" dirty="0"/>
               <a:t>Windows OS</a:t>
             </a:r>
           </a:p>
@@ -10125,7 +10083,7 @@
               <a:buChar char="•"/>
             </a:pPr>
             <a:r>
-              <a:rPr lang="en-US" dirty="0" smtClean="0"/>
+              <a:rPr lang="en-US" dirty="0"/>
               <a:t>App</a:t>
             </a:r>
           </a:p>
@@ -10135,7 +10093,7 @@
               <a:buChar char="•"/>
             </a:pPr>
             <a:r>
-              <a:rPr lang="en-US" dirty="0" smtClean="0"/>
+              <a:rPr lang="en-US" dirty="0"/>
               <a:t>Device</a:t>
             </a:r>
           </a:p>
@@ -10287,29 +10245,23 @@
           <a:lstStyle/>
           <a:p>
             <a:r>
-              <a:rPr lang="en-US" dirty="0" smtClean="0"/>
+              <a:rPr lang="en-US" dirty="0"/>
               <a:t>Set of </a:t>
             </a:r>
             <a:r>
-              <a:rPr lang="en-US" dirty="0" err="1" smtClean="0"/>
+              <a:rPr lang="en-US" dirty="0" err="1"/>
               <a:t>interactable</a:t>
             </a:r>
             <a:r>
-              <a:rPr lang="en-US" dirty="0" smtClean="0"/>
+              <a:rPr lang="en-US" dirty="0"/>
               <a:t> objects</a:t>
             </a:r>
-            <a:endParaRPr lang="en-US" dirty="0"/>
           </a:p>
           <a:p>
             <a:r>
               <a:rPr lang="en-US" dirty="0"/>
-              <a:t>Launch </a:t>
-            </a:r>
-            <a:r>
-              <a:rPr lang="en-US" dirty="0" smtClean="0"/>
-              <a:t>events on boundary cross</a:t>
-            </a:r>
-            <a:endParaRPr lang="en-US" dirty="0"/>
+              <a:t>Launch events on boundary cross</a:t>
+            </a:r>
           </a:p>
           <a:p>
             <a:r>
@@ -10320,33 +10272,23 @@
           <a:p>
             <a:pPr lvl="1"/>
             <a:r>
-              <a:rPr lang="en-US" dirty="0" smtClean="0"/>
-              <a:t>Control for rapid</a:t>
-            </a:r>
-            <a:r>
               <a:rPr lang="en-US" dirty="0"/>
-              <a:t>, random eye movements</a:t>
+              <a:t>Control for rapid, random eye movements</a:t>
             </a:r>
           </a:p>
           <a:p>
             <a:pPr lvl="1"/>
             <a:r>
-              <a:rPr lang="en-US" dirty="0" smtClean="0"/>
+              <a:rPr lang="en-US" dirty="0"/>
               <a:t>Focus until activation </a:t>
             </a:r>
-            <a:endParaRPr lang="en-US" dirty="0"/>
           </a:p>
           <a:p>
             <a:pPr lvl="1"/>
             <a:r>
               <a:rPr lang="en-US" dirty="0"/>
-              <a:t>Manually </a:t>
-            </a:r>
-            <a:r>
-              <a:rPr lang="en-US" dirty="0" smtClean="0"/>
-              <a:t>delay adjustment</a:t>
-            </a:r>
-            <a:endParaRPr lang="en-US" dirty="0"/>
+              <a:t>Manually delay adjustment</a:t>
+            </a:r>
           </a:p>
           <a:p>
             <a:r>
@@ -10364,18 +10306,16 @@
           <a:p>
             <a:pPr lvl="1"/>
             <a:r>
-              <a:rPr lang="en-US" dirty="0" smtClean="0"/>
+              <a:rPr lang="en-US" dirty="0"/>
               <a:t>Sufficiently spacing for visual elements</a:t>
             </a:r>
-            <a:endParaRPr lang="en-US" dirty="0"/>
           </a:p>
           <a:p>
             <a:pPr lvl="1"/>
             <a:r>
-              <a:rPr lang="en-US" dirty="0" smtClean="0"/>
+              <a:rPr lang="en-US" dirty="0"/>
               <a:t>Clear, unobtrusive visual feedback</a:t>
             </a:r>
-            <a:endParaRPr lang="en-US" dirty="0"/>
           </a:p>
         </p:txBody>
       </p:sp>
@@ -10389,13 +10329,6 @@
   <p:clrMapOvr>
     <a:masterClrMapping/>
   </p:clrMapOvr>
-  <p:timing>
-    <p:tnLst>
-      <p:par>
-        <p:cTn id="1" dur="indefinite" restart="never" nodeType="tmRoot"/>
-      </p:par>
-    </p:tnLst>
-  </p:timing>
 </p:sld>
 </file>
 
@@ -10497,10 +10430,9 @@
               <a:buChar char="•"/>
             </a:pPr>
             <a:r>
-              <a:rPr lang="en-US" dirty="0" smtClean="0"/>
+              <a:rPr lang="en-US" dirty="0"/>
               <a:t>Interactor manipulation method</a:t>
             </a:r>
-            <a:endParaRPr lang="en-US" dirty="0"/>
           </a:p>
           <a:p>
             <a:pPr marL="285750" indent="-285750">
@@ -10529,11 +10461,7 @@
             </a:pPr>
             <a:r>
               <a:rPr lang="en-US" dirty="0"/>
-              <a:t>Press key to activate </a:t>
-            </a:r>
-            <a:r>
-              <a:rPr lang="en-US" dirty="0" smtClean="0"/>
-              <a:t>snapshot</a:t>
+              <a:t>Press key to activate snapshot</a:t>
             </a:r>
           </a:p>
           <a:p>
@@ -10556,14 +10484,13 @@
               <a:rPr lang="en-US" dirty="0"/>
               <a:t> Engine queries screen </a:t>
             </a:r>
-            <a:endParaRPr lang="en-US" dirty="0" smtClean="0"/>
           </a:p>
           <a:p>
             <a:pPr marL="742950" lvl="1" indent="-285750">
               <a:buFont typeface="Arial" panose="020B0604020202020204" pitchFamily="34" charset="0"/>
               <a:buChar char="•"/>
             </a:pPr>
-            <a:endParaRPr lang="en-US" dirty="0" smtClean="0"/>
+            <a:endParaRPr lang="en-US" dirty="0"/>
           </a:p>
           <a:p>
             <a:pPr marL="742950" lvl="1" indent="-285750">
@@ -10571,7 +10498,7 @@
               <a:buChar char="•"/>
             </a:pPr>
             <a:r>
-              <a:rPr lang="en-US" dirty="0" smtClean="0"/>
+              <a:rPr lang="en-US" dirty="0"/>
               <a:t>Snapshot returned to Engine</a:t>
             </a:r>
           </a:p>
@@ -10580,7 +10507,7 @@
               <a:buFont typeface="Arial" panose="020B0604020202020204" pitchFamily="34" charset="0"/>
               <a:buChar char="•"/>
             </a:pPr>
-            <a:endParaRPr lang="en-US" dirty="0" smtClean="0"/>
+            <a:endParaRPr lang="en-US" dirty="0"/>
           </a:p>
           <a:p>
             <a:pPr marL="742950" lvl="1" indent="-285750">
@@ -10588,7 +10515,7 @@
               <a:buChar char="•"/>
             </a:pPr>
             <a:r>
-              <a:rPr lang="en-US" dirty="0" smtClean="0"/>
+              <a:rPr lang="en-US" dirty="0"/>
               <a:t>Engine translates to meaning information</a:t>
             </a:r>
           </a:p>
@@ -10597,7 +10524,7 @@
               <a:buFont typeface="Arial" panose="020B0604020202020204" pitchFamily="34" charset="0"/>
               <a:buChar char="•"/>
             </a:pPr>
-            <a:endParaRPr lang="en-US" dirty="0" smtClean="0"/>
+            <a:endParaRPr lang="en-US" dirty="0"/>
           </a:p>
           <a:p>
             <a:pPr marL="742950" lvl="1" indent="-285750">
@@ -10605,7 +10532,7 @@
               <a:buChar char="•"/>
             </a:pPr>
             <a:r>
-              <a:rPr lang="en-US" dirty="0" smtClean="0"/>
+              <a:rPr lang="en-US" dirty="0"/>
               <a:t>Info passed to application</a:t>
             </a:r>
           </a:p>
@@ -10667,13 +10594,6 @@
   <p:clrMapOvr>
     <a:masterClrMapping/>
   </p:clrMapOvr>
-  <p:timing>
-    <p:tnLst>
-      <p:par>
-        <p:cTn id="1" dur="indefinite" restart="never" nodeType="tmRoot"/>
-      </p:par>
-    </p:tnLst>
-  </p:timing>
 </p:sld>
 </file>
 
@@ -10710,10 +10630,9 @@
           <a:lstStyle/>
           <a:p>
             <a:r>
-              <a:rPr lang="en-US" dirty="0" smtClean="0"/>
+              <a:rPr lang="en-US" dirty="0"/>
               <a:t>Control Flow of Application</a:t>
             </a:r>
-            <a:endParaRPr lang="en-US" dirty="0"/>
           </a:p>
         </p:txBody>
       </p:sp>
@@ -10771,7 +10690,7 @@
               <a:buChar char="•"/>
             </a:pPr>
             <a:r>
-              <a:rPr lang="en-US" dirty="0" smtClean="0"/>
+              <a:rPr lang="en-US" dirty="0"/>
               <a:t>User gaze at screen</a:t>
             </a:r>
           </a:p>
@@ -10780,7 +10699,7 @@
               <a:buFont typeface="Arial" panose="020B0604020202020204" pitchFamily="34" charset="0"/>
               <a:buChar char="•"/>
             </a:pPr>
-            <a:endParaRPr lang="en-US" dirty="0" smtClean="0"/>
+            <a:endParaRPr lang="en-US" dirty="0"/>
           </a:p>
           <a:p>
             <a:pPr marL="342900" indent="-342900">
@@ -10788,19 +10707,19 @@
               <a:buChar char="•"/>
             </a:pPr>
             <a:r>
-              <a:rPr lang="en-US" dirty="0" err="1" smtClean="0"/>
+              <a:rPr lang="en-US" dirty="0" err="1"/>
               <a:t>EyeX</a:t>
             </a:r>
             <a:r>
-              <a:rPr lang="en-US" dirty="0" smtClean="0"/>
+              <a:rPr lang="en-US" dirty="0"/>
               <a:t> Controller sends gaze location to </a:t>
             </a:r>
             <a:r>
-              <a:rPr lang="en-US" dirty="0" err="1" smtClean="0"/>
+              <a:rPr lang="en-US" dirty="0" err="1"/>
               <a:t>EyeX</a:t>
             </a:r>
             <a:r>
-              <a:rPr lang="en-US" dirty="0" smtClean="0"/>
+              <a:rPr lang="en-US" dirty="0"/>
               <a:t> Engine</a:t>
             </a:r>
           </a:p>
@@ -10809,7 +10728,7 @@
               <a:buFont typeface="Arial" panose="020B0604020202020204" pitchFamily="34" charset="0"/>
               <a:buChar char="•"/>
             </a:pPr>
-            <a:endParaRPr lang="en-US" dirty="0" smtClean="0"/>
+            <a:endParaRPr lang="en-US" dirty="0"/>
           </a:p>
           <a:p>
             <a:pPr marL="342900" indent="-342900">
@@ -10817,14 +10736,13 @@
               <a:buChar char="•"/>
             </a:pPr>
             <a:r>
-              <a:rPr lang="en-US" dirty="0" err="1" smtClean="0"/>
+              <a:rPr lang="en-US" dirty="0" err="1"/>
               <a:t>EyeX</a:t>
             </a:r>
             <a:r>
-              <a:rPr lang="en-US" dirty="0" smtClean="0"/>
+              <a:rPr lang="en-US" dirty="0"/>
               <a:t> Engine interacts client app to determine type of gaze target </a:t>
             </a:r>
-            <a:endParaRPr lang="en-US" dirty="0"/>
           </a:p>
           <a:p>
             <a:pPr marL="742950" lvl="1" indent="-285750">
@@ -10832,10 +10750,9 @@
               <a:buChar char="•"/>
             </a:pPr>
             <a:r>
-              <a:rPr lang="en-US" dirty="0" smtClean="0"/>
+              <a:rPr lang="en-US" dirty="0"/>
               <a:t>Perform required actions if necessary</a:t>
             </a:r>
-            <a:endParaRPr lang="en-US" dirty="0"/>
           </a:p>
         </p:txBody>
       </p:sp>
@@ -10985,13 +10902,6 @@
   <p:clrMapOvr>
     <a:masterClrMapping/>
   </p:clrMapOvr>
-  <p:timing>
-    <p:tnLst>
-      <p:par>
-        <p:cTn id="1" dur="indefinite" restart="never" nodeType="tmRoot"/>
-      </p:par>
-    </p:tnLst>
-  </p:timing>
 </p:sld>
 </file>
 
@@ -11028,10 +10938,9 @@
           <a:lstStyle/>
           <a:p>
             <a:r>
-              <a:rPr lang="en-US" dirty="0" smtClean="0"/>
+              <a:rPr lang="en-US" dirty="0"/>
               <a:t>Control Flow of Application</a:t>
             </a:r>
-            <a:endParaRPr lang="en-US" dirty="0"/>
           </a:p>
         </p:txBody>
       </p:sp>
@@ -11062,50 +10971,49 @@
           <a:lstStyle/>
           <a:p>
             <a:r>
-              <a:rPr lang="en-US" sz="1600" dirty="0" smtClean="0"/>
+              <a:rPr lang="en-US" sz="1600" dirty="0"/>
               <a:t>Interactor boundary crossed spawns timer</a:t>
             </a:r>
           </a:p>
           <a:p>
             <a:pPr lvl="1"/>
             <a:r>
-              <a:rPr lang="en-US" sz="1400" dirty="0" smtClean="0"/>
+              <a:rPr lang="en-US" sz="1400" dirty="0"/>
               <a:t>Text: short timer</a:t>
             </a:r>
           </a:p>
           <a:p>
             <a:pPr lvl="1"/>
             <a:r>
-              <a:rPr lang="en-US" sz="1400" dirty="0" smtClean="0"/>
+              <a:rPr lang="en-US" sz="1400" dirty="0"/>
               <a:t>Button: long time</a:t>
             </a:r>
-            <a:endParaRPr lang="en-US" sz="1400" dirty="0"/>
-          </a:p>
-          <a:p>
-            <a:endParaRPr lang="en-US" sz="1600" dirty="0" smtClean="0"/>
-          </a:p>
-          <a:p>
-            <a:r>
-              <a:rPr lang="en-US" sz="1600" dirty="0" smtClean="0"/>
+          </a:p>
+          <a:p>
+            <a:endParaRPr lang="en-US" sz="1600" dirty="0"/>
+          </a:p>
+          <a:p>
+            <a:r>
+              <a:rPr lang="en-US" sz="1600" dirty="0"/>
               <a:t>Timer match for button/text</a:t>
             </a:r>
           </a:p>
           <a:p>
             <a:pPr lvl="1"/>
             <a:r>
-              <a:rPr lang="en-US" sz="1400" dirty="0" smtClean="0"/>
+              <a:rPr lang="en-US" sz="1400" dirty="0"/>
               <a:t>Text: highlight and play sound</a:t>
             </a:r>
           </a:p>
           <a:p>
             <a:pPr lvl="1"/>
             <a:r>
-              <a:rPr lang="en-US" sz="1400" dirty="0" smtClean="0"/>
+              <a:rPr lang="en-US" sz="1400" dirty="0"/>
               <a:t>Button: manipulate story</a:t>
             </a:r>
           </a:p>
           <a:p>
-            <a:endParaRPr lang="en-US" sz="1600" dirty="0" smtClean="0"/>
+            <a:endParaRPr lang="en-US" sz="1600" dirty="0"/>
           </a:p>
         </p:txBody>
       </p:sp>
@@ -11204,10 +11112,9 @@
           <a:lstStyle/>
           <a:p>
             <a:r>
-              <a:rPr lang="en-US" sz="1000" dirty="0" smtClean="0"/>
+              <a:rPr lang="en-US" sz="1000" dirty="0"/>
               <a:t>Timer up</a:t>
             </a:r>
-            <a:endParaRPr lang="en-US" sz="1000" dirty="0"/>
           </a:p>
         </p:txBody>
       </p:sp>
@@ -11302,10 +11209,9 @@
           <a:lstStyle/>
           <a:p>
             <a:r>
-              <a:rPr lang="en-US" sz="1000" dirty="0" smtClean="0"/>
+              <a:rPr lang="en-US" sz="1000" dirty="0"/>
               <a:t>Timer start</a:t>
             </a:r>
-            <a:endParaRPr lang="en-US" sz="1000" dirty="0"/>
           </a:p>
         </p:txBody>
       </p:sp>
@@ -11319,13 +11225,6 @@
   <p:clrMapOvr>
     <a:masterClrMapping/>
   </p:clrMapOvr>
-  <p:timing>
-    <p:tnLst>
-      <p:par>
-        <p:cTn id="1" dur="indefinite" restart="never" nodeType="tmRoot"/>
-      </p:par>
-    </p:tnLst>
-  </p:timing>
 </p:sld>
 </file>
 
@@ -11384,16 +11283,8 @@
           <a:lstStyle/>
           <a:p>
             <a:r>
-              <a:rPr lang="en-US" dirty="0" smtClean="0"/>
-              <a:t>Gaze: quick </a:t>
-            </a:r>
-            <a:r>
               <a:rPr lang="en-US" dirty="0"/>
-              <a:t>and </a:t>
-            </a:r>
-            <a:r>
-              <a:rPr lang="en-US" dirty="0" smtClean="0"/>
-              <a:t>natural</a:t>
+              <a:t>Gaze: quick and natural</a:t>
             </a:r>
           </a:p>
           <a:p>
@@ -11408,7 +11299,7 @@
           <a:p>
             <a:pPr lvl="1"/>
             <a:r>
-              <a:rPr lang="en-US" dirty="0" smtClean="0"/>
+              <a:rPr lang="en-US" dirty="0"/>
               <a:t>Intended v. unintended gaze</a:t>
             </a:r>
           </a:p>
@@ -11426,34 +11317,30 @@
           <a:p>
             <a:pPr lvl="1"/>
             <a:r>
-              <a:rPr lang="en-US" dirty="0" smtClean="0"/>
+              <a:rPr lang="en-US" dirty="0"/>
               <a:t>Color and confirm interactors</a:t>
             </a:r>
-            <a:endParaRPr lang="en-US" dirty="0"/>
           </a:p>
           <a:p>
             <a:pPr lvl="1"/>
             <a:r>
-              <a:rPr lang="en-US" dirty="0" smtClean="0"/>
+              <a:rPr lang="en-US" dirty="0"/>
               <a:t>Algorithm highlights potential links</a:t>
             </a:r>
-            <a:endParaRPr lang="en-US" dirty="0"/>
           </a:p>
           <a:p>
             <a:pPr lvl="1"/>
             <a:r>
-              <a:rPr lang="en-US" dirty="0" smtClean="0"/>
+              <a:rPr lang="en-US" dirty="0"/>
               <a:t>Link rich environment</a:t>
             </a:r>
-            <a:endParaRPr lang="en-US" dirty="0"/>
           </a:p>
           <a:p>
             <a:pPr lvl="1"/>
             <a:r>
-              <a:rPr lang="en-US" dirty="0" smtClean="0"/>
+              <a:rPr lang="en-US" dirty="0"/>
               <a:t>Hands-free browsing</a:t>
             </a:r>
-            <a:endParaRPr lang="en-US" dirty="0"/>
           </a:p>
         </p:txBody>
       </p:sp>

</xml_diff>